<commit_message>
complete genData3.m and change plot of both genData2 and 3
</commit_message>
<xml_diff>
--- a/test_result.pptx
+++ b/test_result.pptx
@@ -10,6 +10,7 @@
     <p:sldId id="258" r:id="rId4"/>
     <p:sldId id="259" r:id="rId5"/>
     <p:sldId id="260" r:id="rId6"/>
+    <p:sldId id="261" r:id="rId7"/>
   </p:sldIdLst>
   <p:sldSz cx="12192000" cy="6858000"/>
   <p:notesSz cx="6858000" cy="9144000"/>
@@ -122,6 +123,7 @@
         <p14:section name="제목 없는 구역" id="{32024B44-BEFD-454D-A4A7-B415142D7833}">
           <p14:sldIdLst>
             <p14:sldId id="260"/>
+            <p14:sldId id="261"/>
           </p14:sldIdLst>
         </p14:section>
       </p14:sectionLst>
@@ -3732,10 +3734,10 @@
       </p:grpSpPr>
       <p:pic>
         <p:nvPicPr>
-          <p:cNvPr id="3" name="그림 2">
-            <a:extLst>
-              <a:ext uri="{FF2B5EF4-FFF2-40B4-BE49-F238E27FC236}">
-                <a16:creationId xmlns:a16="http://schemas.microsoft.com/office/drawing/2014/main" id="{8C60A1D3-7C82-40A0-8AAD-B5466ED6FB9E}"/>
+          <p:cNvPr id="14" name="그림 13">
+            <a:extLst>
+              <a:ext uri="{FF2B5EF4-FFF2-40B4-BE49-F238E27FC236}">
+                <a16:creationId xmlns:a16="http://schemas.microsoft.com/office/drawing/2014/main" id="{6A99204A-E18A-4E00-A30C-10D97396E7B4}"/>
               </a:ext>
             </a:extLst>
           </p:cNvPr>
@@ -3752,8 +3754,8 @@
         </p:blipFill>
         <p:spPr>
           <a:xfrm>
-            <a:off x="147919" y="1323358"/>
-            <a:ext cx="5615044" cy="4211283"/>
+            <a:off x="5631931" y="316354"/>
+            <a:ext cx="7002222" cy="5943600"/>
           </a:xfrm>
           <a:prstGeom prst="rect">
             <a:avLst/>
@@ -3762,10 +3764,10 @@
       </p:pic>
       <p:pic>
         <p:nvPicPr>
-          <p:cNvPr id="5" name="그림 4">
-            <a:extLst>
-              <a:ext uri="{FF2B5EF4-FFF2-40B4-BE49-F238E27FC236}">
-                <a16:creationId xmlns:a16="http://schemas.microsoft.com/office/drawing/2014/main" id="{CFE88632-F8D8-4D22-A6D5-907B68825B5E}"/>
+          <p:cNvPr id="4" name="그림 3">
+            <a:extLst>
+              <a:ext uri="{FF2B5EF4-FFF2-40B4-BE49-F238E27FC236}">
+                <a16:creationId xmlns:a16="http://schemas.microsoft.com/office/drawing/2014/main" id="{365C9002-5D7A-4EE2-88FF-0934AD373DB1}"/>
               </a:ext>
             </a:extLst>
           </p:cNvPr>
@@ -3782,8 +3784,214 @@
         </p:blipFill>
         <p:spPr>
           <a:xfrm>
-            <a:off x="5932845" y="1189223"/>
-            <a:ext cx="6259155" cy="4694366"/>
+            <a:off x="1998470" y="342362"/>
+            <a:ext cx="2781688" cy="3419952"/>
+          </a:xfrm>
+          <a:prstGeom prst="rect">
+            <a:avLst/>
+          </a:prstGeom>
+        </p:spPr>
+      </p:pic>
+      <p:pic>
+        <p:nvPicPr>
+          <p:cNvPr id="7" name="그림 6">
+            <a:extLst>
+              <a:ext uri="{FF2B5EF4-FFF2-40B4-BE49-F238E27FC236}">
+                <a16:creationId xmlns:a16="http://schemas.microsoft.com/office/drawing/2014/main" id="{87FCF083-44DA-473F-887E-E53B7852CF96}"/>
+              </a:ext>
+            </a:extLst>
+          </p:cNvPr>
+          <p:cNvPicPr>
+            <a:picLocks noChangeAspect="1"/>
+          </p:cNvPicPr>
+          <p:nvPr/>
+        </p:nvPicPr>
+        <p:blipFill>
+          <a:blip r:embed="rId4"/>
+          <a:stretch>
+            <a:fillRect/>
+          </a:stretch>
+        </p:blipFill>
+        <p:spPr>
+          <a:xfrm>
+            <a:off x="0" y="3446397"/>
+            <a:ext cx="6096347" cy="2971970"/>
+          </a:xfrm>
+          <a:prstGeom prst="rect">
+            <a:avLst/>
+          </a:prstGeom>
+        </p:spPr>
+      </p:pic>
+      <p:sp>
+        <p:nvSpPr>
+          <p:cNvPr id="10" name="직사각형 9">
+            <a:extLst>
+              <a:ext uri="{FF2B5EF4-FFF2-40B4-BE49-F238E27FC236}">
+                <a16:creationId xmlns:a16="http://schemas.microsoft.com/office/drawing/2014/main" id="{8821E506-8EE5-47A1-8FBA-4843B215A869}"/>
+              </a:ext>
+            </a:extLst>
+          </p:cNvPr>
+          <p:cNvSpPr/>
+          <p:nvPr/>
+        </p:nvSpPr>
+        <p:spPr>
+          <a:xfrm>
+            <a:off x="6495218" y="4584667"/>
+            <a:ext cx="2476235" cy="1215614"/>
+          </a:xfrm>
+          <a:prstGeom prst="rect">
+            <a:avLst/>
+          </a:prstGeom>
+          <a:solidFill>
+            <a:srgbClr val="FF0000">
+              <a:alpha val="20000"/>
+            </a:srgbClr>
+          </a:solidFill>
+          <a:ln>
+            <a:solidFill>
+              <a:srgbClr val="FF0000"/>
+            </a:solidFill>
+          </a:ln>
+        </p:spPr>
+        <p:style>
+          <a:lnRef idx="2">
+            <a:schemeClr val="accent1">
+              <a:shade val="50000"/>
+            </a:schemeClr>
+          </a:lnRef>
+          <a:fillRef idx="1">
+            <a:schemeClr val="accent1"/>
+          </a:fillRef>
+          <a:effectRef idx="0">
+            <a:schemeClr val="accent1"/>
+          </a:effectRef>
+          <a:fontRef idx="minor">
+            <a:schemeClr val="lt1"/>
+          </a:fontRef>
+        </p:style>
+        <p:txBody>
+          <a:bodyPr rtlCol="0" anchor="ctr"/>
+          <a:lstStyle/>
+          <a:p>
+            <a:pPr algn="ctr"/>
+            <a:endParaRPr lang="ko-KR" altLang="en-US" dirty="0"/>
+          </a:p>
+        </p:txBody>
+      </p:sp>
+    </p:spTree>
+    <p:extLst>
+      <p:ext uri="{BB962C8B-B14F-4D97-AF65-F5344CB8AC3E}">
+        <p14:creationId xmlns:p14="http://schemas.microsoft.com/office/powerpoint/2010/main" val="3391189522"/>
+      </p:ext>
+    </p:extLst>
+  </p:cSld>
+  <p:clrMapOvr>
+    <a:masterClrMapping/>
+  </p:clrMapOvr>
+</p:sld>
+</file>
+
+<file path=ppt/slides/slide6.xml><?xml version="1.0" encoding="utf-8"?>
+<p:sld xmlns:a="http://schemas.openxmlformats.org/drawingml/2006/main" xmlns:r="http://schemas.openxmlformats.org/officeDocument/2006/relationships" xmlns:p="http://schemas.openxmlformats.org/presentationml/2006/main">
+  <p:cSld>
+    <p:spTree>
+      <p:nvGrpSpPr>
+        <p:cNvPr id="1" name=""/>
+        <p:cNvGrpSpPr/>
+        <p:nvPr/>
+      </p:nvGrpSpPr>
+      <p:grpSpPr>
+        <a:xfrm>
+          <a:off x="0" y="0"/>
+          <a:ext cx="0" cy="0"/>
+          <a:chOff x="0" y="0"/>
+          <a:chExt cx="0" cy="0"/>
+        </a:xfrm>
+      </p:grpSpPr>
+      <p:pic>
+        <p:nvPicPr>
+          <p:cNvPr id="9" name="그림 8">
+            <a:extLst>
+              <a:ext uri="{FF2B5EF4-FFF2-40B4-BE49-F238E27FC236}">
+                <a16:creationId xmlns:a16="http://schemas.microsoft.com/office/drawing/2014/main" id="{93345F66-8624-4F5E-99AE-AE00BAE3E08F}"/>
+              </a:ext>
+            </a:extLst>
+          </p:cNvPr>
+          <p:cNvPicPr>
+            <a:picLocks noChangeAspect="1"/>
+          </p:cNvPicPr>
+          <p:nvPr/>
+        </p:nvPicPr>
+        <p:blipFill>
+          <a:blip r:embed="rId2"/>
+          <a:stretch>
+            <a:fillRect/>
+          </a:stretch>
+        </p:blipFill>
+        <p:spPr>
+          <a:xfrm>
+            <a:off x="1998054" y="421043"/>
+            <a:ext cx="2629267" cy="3477110"/>
+          </a:xfrm>
+          <a:prstGeom prst="rect">
+            <a:avLst/>
+          </a:prstGeom>
+        </p:spPr>
+      </p:pic>
+      <p:pic>
+        <p:nvPicPr>
+          <p:cNvPr id="14" name="그림 13">
+            <a:extLst>
+              <a:ext uri="{FF2B5EF4-FFF2-40B4-BE49-F238E27FC236}">
+                <a16:creationId xmlns:a16="http://schemas.microsoft.com/office/drawing/2014/main" id="{D66D3AC6-F0C6-4928-A8E5-DC5018179A5C}"/>
+              </a:ext>
+            </a:extLst>
+          </p:cNvPr>
+          <p:cNvPicPr>
+            <a:picLocks noChangeAspect="1"/>
+          </p:cNvPicPr>
+          <p:nvPr/>
+        </p:nvPicPr>
+        <p:blipFill>
+          <a:blip r:embed="rId3"/>
+          <a:stretch>
+            <a:fillRect/>
+          </a:stretch>
+        </p:blipFill>
+        <p:spPr>
+          <a:xfrm>
+            <a:off x="495616" y="3302597"/>
+            <a:ext cx="5396283" cy="3767866"/>
+          </a:xfrm>
+          <a:prstGeom prst="rect">
+            <a:avLst/>
+          </a:prstGeom>
+        </p:spPr>
+      </p:pic>
+      <p:pic>
+        <p:nvPicPr>
+          <p:cNvPr id="18" name="그림 17">
+            <a:extLst>
+              <a:ext uri="{FF2B5EF4-FFF2-40B4-BE49-F238E27FC236}">
+                <a16:creationId xmlns:a16="http://schemas.microsoft.com/office/drawing/2014/main" id="{EF46520B-F30F-459F-9405-3F9FBD282A15}"/>
+              </a:ext>
+            </a:extLst>
+          </p:cNvPr>
+          <p:cNvPicPr>
+            <a:picLocks noChangeAspect="1"/>
+          </p:cNvPicPr>
+          <p:nvPr/>
+        </p:nvPicPr>
+        <p:blipFill>
+          <a:blip r:embed="rId4"/>
+          <a:stretch>
+            <a:fillRect/>
+          </a:stretch>
+        </p:blipFill>
+        <p:spPr>
+          <a:xfrm>
+            <a:off x="6129759" y="457200"/>
+            <a:ext cx="5891897" cy="5943600"/>
           </a:xfrm>
           <a:prstGeom prst="rect">
             <a:avLst/>
@@ -3793,7 +4001,7 @@
     </p:spTree>
     <p:extLst>
       <p:ext uri="{BB962C8B-B14F-4D97-AF65-F5344CB8AC3E}">
-        <p14:creationId xmlns:p14="http://schemas.microsoft.com/office/powerpoint/2010/main" val="3391189522"/>
+        <p14:creationId xmlns:p14="http://schemas.microsoft.com/office/powerpoint/2010/main" val="2062764662"/>
       </p:ext>
     </p:extLst>
   </p:cSld>

</xml_diff>

<commit_message>
Complete the simulation for the patterns in detail
number of patterns: 12
</commit_message>
<xml_diff>
--- a/test_result.pptx
+++ b/test_result.pptx
@@ -5,12 +5,13 @@
     <p:sldMasterId id="2147483648" r:id="rId1"/>
   </p:sldMasterIdLst>
   <p:sldIdLst>
-    <p:sldId id="256" r:id="rId2"/>
-    <p:sldId id="257" r:id="rId3"/>
-    <p:sldId id="258" r:id="rId4"/>
-    <p:sldId id="259" r:id="rId5"/>
-    <p:sldId id="260" r:id="rId6"/>
-    <p:sldId id="261" r:id="rId7"/>
+    <p:sldId id="260" r:id="rId2"/>
+    <p:sldId id="261" r:id="rId3"/>
+    <p:sldId id="262" r:id="rId4"/>
+    <p:sldId id="256" r:id="rId5"/>
+    <p:sldId id="257" r:id="rId6"/>
+    <p:sldId id="258" r:id="rId7"/>
+    <p:sldId id="259" r:id="rId8"/>
   </p:sldIdLst>
   <p:sldSz cx="12192000" cy="6858000"/>
   <p:notesSz cx="6858000" cy="9144000"/>
@@ -112,18 +113,22 @@
   <p:extLst>
     <p:ext uri="{521415D9-36F7-43E2-AB2F-B90AF26B5E84}">
       <p14:sectionLst xmlns:p14="http://schemas.microsoft.com/office/powerpoint/2010/main">
+        <p14:section name="제목 없는 구역" id="{EF8DBE1B-C95A-40FF-85F1-335983CD1CC0}">
+          <p14:sldIdLst/>
+        </p14:section>
+        <p14:section name="제목 없는 구역" id="{32024B44-BEFD-454D-A4A7-B415142D7833}">
+          <p14:sldIdLst>
+            <p14:sldId id="260"/>
+            <p14:sldId id="261"/>
+            <p14:sldId id="262"/>
+          </p14:sldIdLst>
+        </p14:section>
         <p14:section name="기본 구역" id="{A65F16B5-72E8-4769-ACB5-1A4373B2E5AB}">
           <p14:sldIdLst>
             <p14:sldId id="256"/>
             <p14:sldId id="257"/>
             <p14:sldId id="258"/>
             <p14:sldId id="259"/>
-          </p14:sldIdLst>
-        </p14:section>
-        <p14:section name="제목 없는 구역" id="{32024B44-BEFD-454D-A4A7-B415142D7833}">
-          <p14:sldIdLst>
-            <p14:sldId id="260"/>
-            <p14:sldId id="261"/>
           </p14:sldIdLst>
         </p14:section>
       </p14:sectionLst>
@@ -3362,378 +3367,6 @@
       </p:grpSpPr>
       <p:pic>
         <p:nvPicPr>
-          <p:cNvPr id="7" name="그림 6">
-            <a:extLst>
-              <a:ext uri="{FF2B5EF4-FFF2-40B4-BE49-F238E27FC236}">
-                <a16:creationId xmlns:a16="http://schemas.microsoft.com/office/drawing/2014/main" id="{F904E707-9E18-4FE6-884B-7FFD3098446E}"/>
-              </a:ext>
-            </a:extLst>
-          </p:cNvPr>
-          <p:cNvPicPr>
-            <a:picLocks noChangeAspect="1"/>
-          </p:cNvPicPr>
-          <p:nvPr/>
-        </p:nvPicPr>
-        <p:blipFill>
-          <a:blip r:embed="rId2"/>
-          <a:stretch>
-            <a:fillRect/>
-          </a:stretch>
-        </p:blipFill>
-        <p:spPr>
-          <a:xfrm>
-            <a:off x="0" y="457200"/>
-            <a:ext cx="12192000" cy="5943600"/>
-          </a:xfrm>
-          <a:prstGeom prst="rect">
-            <a:avLst/>
-          </a:prstGeom>
-        </p:spPr>
-      </p:pic>
-    </p:spTree>
-    <p:extLst>
-      <p:ext uri="{BB962C8B-B14F-4D97-AF65-F5344CB8AC3E}">
-        <p14:creationId xmlns:p14="http://schemas.microsoft.com/office/powerpoint/2010/main" val="3908089619"/>
-      </p:ext>
-    </p:extLst>
-  </p:cSld>
-  <p:clrMapOvr>
-    <a:masterClrMapping/>
-  </p:clrMapOvr>
-</p:sld>
-</file>
-
-<file path=ppt/slides/slide2.xml><?xml version="1.0" encoding="utf-8"?>
-<p:sld xmlns:a="http://schemas.openxmlformats.org/drawingml/2006/main" xmlns:r="http://schemas.openxmlformats.org/officeDocument/2006/relationships" xmlns:p="http://schemas.openxmlformats.org/presentationml/2006/main">
-  <p:cSld>
-    <p:spTree>
-      <p:nvGrpSpPr>
-        <p:cNvPr id="1" name=""/>
-        <p:cNvGrpSpPr/>
-        <p:nvPr/>
-      </p:nvGrpSpPr>
-      <p:grpSpPr>
-        <a:xfrm>
-          <a:off x="0" y="0"/>
-          <a:ext cx="0" cy="0"/>
-          <a:chOff x="0" y="0"/>
-          <a:chExt cx="0" cy="0"/>
-        </a:xfrm>
-      </p:grpSpPr>
-      <p:pic>
-        <p:nvPicPr>
-          <p:cNvPr id="3" name="그림 2">
-            <a:extLst>
-              <a:ext uri="{FF2B5EF4-FFF2-40B4-BE49-F238E27FC236}">
-                <a16:creationId xmlns:a16="http://schemas.microsoft.com/office/drawing/2014/main" id="{7A733A21-6F9B-4096-B4DA-88DD96D95667}"/>
-              </a:ext>
-            </a:extLst>
-          </p:cNvPr>
-          <p:cNvPicPr>
-            <a:picLocks noChangeAspect="1"/>
-          </p:cNvPicPr>
-          <p:nvPr/>
-        </p:nvPicPr>
-        <p:blipFill>
-          <a:blip r:embed="rId2"/>
-          <a:stretch>
-            <a:fillRect/>
-          </a:stretch>
-        </p:blipFill>
-        <p:spPr>
-          <a:xfrm>
-            <a:off x="0" y="457200"/>
-            <a:ext cx="12192000" cy="5943600"/>
-          </a:xfrm>
-          <a:prstGeom prst="rect">
-            <a:avLst/>
-          </a:prstGeom>
-        </p:spPr>
-      </p:pic>
-      <p:sp>
-        <p:nvSpPr>
-          <p:cNvPr id="2" name="TextBox 1">
-            <a:extLst>
-              <a:ext uri="{FF2B5EF4-FFF2-40B4-BE49-F238E27FC236}">
-                <a16:creationId xmlns:a16="http://schemas.microsoft.com/office/drawing/2014/main" id="{7FA18ECA-B8F9-47B2-B57C-2CAC013368C1}"/>
-              </a:ext>
-            </a:extLst>
-          </p:cNvPr>
-          <p:cNvSpPr txBox="1"/>
-          <p:nvPr/>
-        </p:nvSpPr>
-        <p:spPr>
-          <a:xfrm>
-            <a:off x="387275" y="272534"/>
-            <a:ext cx="3248809" cy="369332"/>
-          </a:xfrm>
-          <a:prstGeom prst="rect">
-            <a:avLst/>
-          </a:prstGeom>
-          <a:noFill/>
-        </p:spPr>
-        <p:txBody>
-          <a:bodyPr wrap="square" rtlCol="0">
-            <a:spAutoFit/>
-          </a:bodyPr>
-          <a:lstStyle/>
-          <a:p>
-            <a:r>
-              <a:rPr lang="en-US" altLang="ko-KR" dirty="0"/>
-              <a:t>Amp:1, </a:t>
-            </a:r>
-            <a:r>
-              <a:rPr lang="en-US" altLang="ko-KR" dirty="0" err="1"/>
-              <a:t>pnts</a:t>
-            </a:r>
-            <a:r>
-              <a:rPr lang="en-US" altLang="ko-KR" dirty="0"/>
-              <a:t>: 100, N:10</a:t>
-            </a:r>
-            <a:endParaRPr lang="ko-KR" altLang="en-US" dirty="0"/>
-          </a:p>
-        </p:txBody>
-      </p:sp>
-    </p:spTree>
-    <p:extLst>
-      <p:ext uri="{BB962C8B-B14F-4D97-AF65-F5344CB8AC3E}">
-        <p14:creationId xmlns:p14="http://schemas.microsoft.com/office/powerpoint/2010/main" val="3279852663"/>
-      </p:ext>
-    </p:extLst>
-  </p:cSld>
-  <p:clrMapOvr>
-    <a:masterClrMapping/>
-  </p:clrMapOvr>
-</p:sld>
-</file>
-
-<file path=ppt/slides/slide3.xml><?xml version="1.0" encoding="utf-8"?>
-<p:sld xmlns:a="http://schemas.openxmlformats.org/drawingml/2006/main" xmlns:r="http://schemas.openxmlformats.org/officeDocument/2006/relationships" xmlns:p="http://schemas.openxmlformats.org/presentationml/2006/main">
-  <p:cSld>
-    <p:spTree>
-      <p:nvGrpSpPr>
-        <p:cNvPr id="1" name=""/>
-        <p:cNvGrpSpPr/>
-        <p:nvPr/>
-      </p:nvGrpSpPr>
-      <p:grpSpPr>
-        <a:xfrm>
-          <a:off x="0" y="0"/>
-          <a:ext cx="0" cy="0"/>
-          <a:chOff x="0" y="0"/>
-          <a:chExt cx="0" cy="0"/>
-        </a:xfrm>
-      </p:grpSpPr>
-      <p:pic>
-        <p:nvPicPr>
-          <p:cNvPr id="3" name="그림 2">
-            <a:extLst>
-              <a:ext uri="{FF2B5EF4-FFF2-40B4-BE49-F238E27FC236}">
-                <a16:creationId xmlns:a16="http://schemas.microsoft.com/office/drawing/2014/main" id="{62003483-E80B-4EA7-B05B-D21F2B3985D7}"/>
-              </a:ext>
-            </a:extLst>
-          </p:cNvPr>
-          <p:cNvPicPr>
-            <a:picLocks noChangeAspect="1"/>
-          </p:cNvPicPr>
-          <p:nvPr/>
-        </p:nvPicPr>
-        <p:blipFill>
-          <a:blip r:embed="rId2"/>
-          <a:stretch>
-            <a:fillRect/>
-          </a:stretch>
-        </p:blipFill>
-        <p:spPr>
-          <a:xfrm>
-            <a:off x="0" y="457200"/>
-            <a:ext cx="12192000" cy="5943600"/>
-          </a:xfrm>
-          <a:prstGeom prst="rect">
-            <a:avLst/>
-          </a:prstGeom>
-        </p:spPr>
-      </p:pic>
-      <p:sp>
-        <p:nvSpPr>
-          <p:cNvPr id="4" name="TextBox 3">
-            <a:extLst>
-              <a:ext uri="{FF2B5EF4-FFF2-40B4-BE49-F238E27FC236}">
-                <a16:creationId xmlns:a16="http://schemas.microsoft.com/office/drawing/2014/main" id="{BC59C00E-D95B-4FE9-9E06-849CE87F35B9}"/>
-              </a:ext>
-            </a:extLst>
-          </p:cNvPr>
-          <p:cNvSpPr txBox="1"/>
-          <p:nvPr/>
-        </p:nvSpPr>
-        <p:spPr>
-          <a:xfrm>
-            <a:off x="387276" y="272534"/>
-            <a:ext cx="914400" cy="369332"/>
-          </a:xfrm>
-          <a:prstGeom prst="rect">
-            <a:avLst/>
-          </a:prstGeom>
-          <a:noFill/>
-        </p:spPr>
-        <p:txBody>
-          <a:bodyPr wrap="square" rtlCol="0">
-            <a:spAutoFit/>
-          </a:bodyPr>
-          <a:lstStyle/>
-          <a:p>
-            <a:r>
-              <a:rPr lang="en-US" altLang="ko-KR" dirty="0"/>
-              <a:t>Amp:2</a:t>
-            </a:r>
-            <a:endParaRPr lang="ko-KR" altLang="en-US" dirty="0"/>
-          </a:p>
-        </p:txBody>
-      </p:sp>
-    </p:spTree>
-    <p:extLst>
-      <p:ext uri="{BB962C8B-B14F-4D97-AF65-F5344CB8AC3E}">
-        <p14:creationId xmlns:p14="http://schemas.microsoft.com/office/powerpoint/2010/main" val="2454697990"/>
-      </p:ext>
-    </p:extLst>
-  </p:cSld>
-  <p:clrMapOvr>
-    <a:masterClrMapping/>
-  </p:clrMapOvr>
-</p:sld>
-</file>
-
-<file path=ppt/slides/slide4.xml><?xml version="1.0" encoding="utf-8"?>
-<p:sld xmlns:a="http://schemas.openxmlformats.org/drawingml/2006/main" xmlns:r="http://schemas.openxmlformats.org/officeDocument/2006/relationships" xmlns:p="http://schemas.openxmlformats.org/presentationml/2006/main">
-  <p:cSld>
-    <p:spTree>
-      <p:nvGrpSpPr>
-        <p:cNvPr id="1" name=""/>
-        <p:cNvGrpSpPr/>
-        <p:nvPr/>
-      </p:nvGrpSpPr>
-      <p:grpSpPr>
-        <a:xfrm>
-          <a:off x="0" y="0"/>
-          <a:ext cx="0" cy="0"/>
-          <a:chOff x="0" y="0"/>
-          <a:chExt cx="0" cy="0"/>
-        </a:xfrm>
-      </p:grpSpPr>
-      <p:pic>
-        <p:nvPicPr>
-          <p:cNvPr id="3" name="그림 2">
-            <a:extLst>
-              <a:ext uri="{FF2B5EF4-FFF2-40B4-BE49-F238E27FC236}">
-                <a16:creationId xmlns:a16="http://schemas.microsoft.com/office/drawing/2014/main" id="{D81D502E-E16F-43E9-8C9F-BB3FEEE6E9AE}"/>
-              </a:ext>
-            </a:extLst>
-          </p:cNvPr>
-          <p:cNvPicPr>
-            <a:picLocks noChangeAspect="1"/>
-          </p:cNvPicPr>
-          <p:nvPr/>
-        </p:nvPicPr>
-        <p:blipFill>
-          <a:blip r:embed="rId2"/>
-          <a:stretch>
-            <a:fillRect/>
-          </a:stretch>
-        </p:blipFill>
-        <p:spPr>
-          <a:xfrm>
-            <a:off x="0" y="457200"/>
-            <a:ext cx="12192000" cy="5943600"/>
-          </a:xfrm>
-          <a:prstGeom prst="rect">
-            <a:avLst/>
-          </a:prstGeom>
-        </p:spPr>
-      </p:pic>
-      <p:sp>
-        <p:nvSpPr>
-          <p:cNvPr id="4" name="TextBox 3">
-            <a:extLst>
-              <a:ext uri="{FF2B5EF4-FFF2-40B4-BE49-F238E27FC236}">
-                <a16:creationId xmlns:a16="http://schemas.microsoft.com/office/drawing/2014/main" id="{632B2EF2-0BA0-4EFE-A38D-4A8171EC7C32}"/>
-              </a:ext>
-            </a:extLst>
-          </p:cNvPr>
-          <p:cNvSpPr txBox="1"/>
-          <p:nvPr/>
-        </p:nvSpPr>
-        <p:spPr>
-          <a:xfrm>
-            <a:off x="387275" y="272534"/>
-            <a:ext cx="3248809" cy="369332"/>
-          </a:xfrm>
-          <a:prstGeom prst="rect">
-            <a:avLst/>
-          </a:prstGeom>
-          <a:noFill/>
-        </p:spPr>
-        <p:txBody>
-          <a:bodyPr wrap="square" rtlCol="0">
-            <a:spAutoFit/>
-          </a:bodyPr>
-          <a:lstStyle/>
-          <a:p>
-            <a:r>
-              <a:rPr lang="en-US" altLang="ko-KR" dirty="0"/>
-              <a:t>Amp:1, </a:t>
-            </a:r>
-            <a:r>
-              <a:rPr lang="en-US" altLang="ko-KR" dirty="0" err="1"/>
-              <a:t>pnts</a:t>
-            </a:r>
-            <a:r>
-              <a:rPr lang="en-US" altLang="ko-KR"/>
-              <a:t>: 1000</a:t>
-            </a:r>
-            <a:r>
-              <a:rPr lang="en-US" altLang="ko-KR" dirty="0"/>
-              <a:t>, N</a:t>
-            </a:r>
-            <a:r>
-              <a:rPr lang="en-US" altLang="ko-KR"/>
-              <a:t>:100</a:t>
-            </a:r>
-            <a:endParaRPr lang="ko-KR" altLang="en-US" dirty="0"/>
-          </a:p>
-        </p:txBody>
-      </p:sp>
-    </p:spTree>
-    <p:extLst>
-      <p:ext uri="{BB962C8B-B14F-4D97-AF65-F5344CB8AC3E}">
-        <p14:creationId xmlns:p14="http://schemas.microsoft.com/office/powerpoint/2010/main" val="3998537864"/>
-      </p:ext>
-    </p:extLst>
-  </p:cSld>
-  <p:clrMapOvr>
-    <a:masterClrMapping/>
-  </p:clrMapOvr>
-</p:sld>
-</file>
-
-<file path=ppt/slides/slide5.xml><?xml version="1.0" encoding="utf-8"?>
-<p:sld xmlns:a="http://schemas.openxmlformats.org/drawingml/2006/main" xmlns:r="http://schemas.openxmlformats.org/officeDocument/2006/relationships" xmlns:p="http://schemas.openxmlformats.org/presentationml/2006/main">
-  <p:cSld>
-    <p:spTree>
-      <p:nvGrpSpPr>
-        <p:cNvPr id="1" name=""/>
-        <p:cNvGrpSpPr/>
-        <p:nvPr/>
-      </p:nvGrpSpPr>
-      <p:grpSpPr>
-        <a:xfrm>
-          <a:off x="0" y="0"/>
-          <a:ext cx="0" cy="0"/>
-          <a:chOff x="0" y="0"/>
-          <a:chExt cx="0" cy="0"/>
-        </a:xfrm>
-      </p:grpSpPr>
-      <p:pic>
-        <p:nvPicPr>
           <p:cNvPr id="14" name="그림 13">
             <a:extLst>
               <a:ext uri="{FF2B5EF4-FFF2-40B4-BE49-F238E27FC236}">
@@ -3784,7 +3417,7 @@
         </p:blipFill>
         <p:spPr>
           <a:xfrm>
-            <a:off x="1998470" y="342362"/>
+            <a:off x="1657329" y="439633"/>
             <a:ext cx="2781688" cy="3419952"/>
           </a:xfrm>
           <a:prstGeom prst="rect">
@@ -3891,7 +3524,7 @@
 </p:sld>
 </file>
 
-<file path=ppt/slides/slide6.xml><?xml version="1.0" encoding="utf-8"?>
+<file path=ppt/slides/slide2.xml><?xml version="1.0" encoding="utf-8"?>
 <p:sld xmlns:a="http://schemas.openxmlformats.org/drawingml/2006/main" xmlns:r="http://schemas.openxmlformats.org/officeDocument/2006/relationships" xmlns:p="http://schemas.openxmlformats.org/presentationml/2006/main">
   <p:cSld>
     <p:spTree>
@@ -4002,6 +3635,468 @@
     <p:extLst>
       <p:ext uri="{BB962C8B-B14F-4D97-AF65-F5344CB8AC3E}">
         <p14:creationId xmlns:p14="http://schemas.microsoft.com/office/powerpoint/2010/main" val="2062764662"/>
+      </p:ext>
+    </p:extLst>
+  </p:cSld>
+  <p:clrMapOvr>
+    <a:masterClrMapping/>
+  </p:clrMapOvr>
+</p:sld>
+</file>
+
+<file path=ppt/slides/slide3.xml><?xml version="1.0" encoding="utf-8"?>
+<p:sld xmlns:a="http://schemas.openxmlformats.org/drawingml/2006/main" xmlns:r="http://schemas.openxmlformats.org/officeDocument/2006/relationships" xmlns:p="http://schemas.openxmlformats.org/presentationml/2006/main">
+  <p:cSld>
+    <p:spTree>
+      <p:nvGrpSpPr>
+        <p:cNvPr id="1" name=""/>
+        <p:cNvGrpSpPr/>
+        <p:nvPr/>
+      </p:nvGrpSpPr>
+      <p:grpSpPr>
+        <a:xfrm>
+          <a:off x="0" y="0"/>
+          <a:ext cx="0" cy="0"/>
+          <a:chOff x="0" y="0"/>
+          <a:chExt cx="0" cy="0"/>
+        </a:xfrm>
+      </p:grpSpPr>
+      <p:pic>
+        <p:nvPicPr>
+          <p:cNvPr id="3" name="그림 2">
+            <a:extLst>
+              <a:ext uri="{FF2B5EF4-FFF2-40B4-BE49-F238E27FC236}">
+                <a16:creationId xmlns:a16="http://schemas.microsoft.com/office/drawing/2014/main" id="{020FC841-B09F-4976-94E4-F82F3D875AF6}"/>
+              </a:ext>
+            </a:extLst>
+          </p:cNvPr>
+          <p:cNvPicPr>
+            <a:picLocks noChangeAspect="1"/>
+          </p:cNvPicPr>
+          <p:nvPr/>
+        </p:nvPicPr>
+        <p:blipFill>
+          <a:blip r:embed="rId2"/>
+          <a:stretch>
+            <a:fillRect/>
+          </a:stretch>
+        </p:blipFill>
+        <p:spPr>
+          <a:xfrm>
+            <a:off x="-580913" y="1352773"/>
+            <a:ext cx="7121562" cy="4152453"/>
+          </a:xfrm>
+          <a:prstGeom prst="rect">
+            <a:avLst/>
+          </a:prstGeom>
+        </p:spPr>
+      </p:pic>
+      <p:pic>
+        <p:nvPicPr>
+          <p:cNvPr id="5" name="그림 4">
+            <a:extLst>
+              <a:ext uri="{FF2B5EF4-FFF2-40B4-BE49-F238E27FC236}">
+                <a16:creationId xmlns:a16="http://schemas.microsoft.com/office/drawing/2014/main" id="{7229D8B2-536C-46F8-8EBB-F73366109EB9}"/>
+              </a:ext>
+            </a:extLst>
+          </p:cNvPr>
+          <p:cNvPicPr>
+            <a:picLocks noChangeAspect="1"/>
+          </p:cNvPicPr>
+          <p:nvPr/>
+        </p:nvPicPr>
+        <p:blipFill>
+          <a:blip r:embed="rId3"/>
+          <a:stretch>
+            <a:fillRect/>
+          </a:stretch>
+        </p:blipFill>
+        <p:spPr>
+          <a:xfrm>
+            <a:off x="6260951" y="1132242"/>
+            <a:ext cx="5931049" cy="4593515"/>
+          </a:xfrm>
+          <a:prstGeom prst="rect">
+            <a:avLst/>
+          </a:prstGeom>
+        </p:spPr>
+      </p:pic>
+    </p:spTree>
+    <p:extLst>
+      <p:ext uri="{BB962C8B-B14F-4D97-AF65-F5344CB8AC3E}">
+        <p14:creationId xmlns:p14="http://schemas.microsoft.com/office/powerpoint/2010/main" val="1466586383"/>
+      </p:ext>
+    </p:extLst>
+  </p:cSld>
+  <p:clrMapOvr>
+    <a:masterClrMapping/>
+  </p:clrMapOvr>
+</p:sld>
+</file>
+
+<file path=ppt/slides/slide4.xml><?xml version="1.0" encoding="utf-8"?>
+<p:sld xmlns:a="http://schemas.openxmlformats.org/drawingml/2006/main" xmlns:r="http://schemas.openxmlformats.org/officeDocument/2006/relationships" xmlns:p="http://schemas.openxmlformats.org/presentationml/2006/main">
+  <p:cSld>
+    <p:spTree>
+      <p:nvGrpSpPr>
+        <p:cNvPr id="1" name=""/>
+        <p:cNvGrpSpPr/>
+        <p:nvPr/>
+      </p:nvGrpSpPr>
+      <p:grpSpPr>
+        <a:xfrm>
+          <a:off x="0" y="0"/>
+          <a:ext cx="0" cy="0"/>
+          <a:chOff x="0" y="0"/>
+          <a:chExt cx="0" cy="0"/>
+        </a:xfrm>
+      </p:grpSpPr>
+      <p:pic>
+        <p:nvPicPr>
+          <p:cNvPr id="7" name="그림 6">
+            <a:extLst>
+              <a:ext uri="{FF2B5EF4-FFF2-40B4-BE49-F238E27FC236}">
+                <a16:creationId xmlns:a16="http://schemas.microsoft.com/office/drawing/2014/main" id="{F904E707-9E18-4FE6-884B-7FFD3098446E}"/>
+              </a:ext>
+            </a:extLst>
+          </p:cNvPr>
+          <p:cNvPicPr>
+            <a:picLocks noChangeAspect="1"/>
+          </p:cNvPicPr>
+          <p:nvPr/>
+        </p:nvPicPr>
+        <p:blipFill>
+          <a:blip r:embed="rId2"/>
+          <a:stretch>
+            <a:fillRect/>
+          </a:stretch>
+        </p:blipFill>
+        <p:spPr>
+          <a:xfrm>
+            <a:off x="0" y="457200"/>
+            <a:ext cx="12192000" cy="5943600"/>
+          </a:xfrm>
+          <a:prstGeom prst="rect">
+            <a:avLst/>
+          </a:prstGeom>
+        </p:spPr>
+      </p:pic>
+    </p:spTree>
+    <p:extLst>
+      <p:ext uri="{BB962C8B-B14F-4D97-AF65-F5344CB8AC3E}">
+        <p14:creationId xmlns:p14="http://schemas.microsoft.com/office/powerpoint/2010/main" val="3908089619"/>
+      </p:ext>
+    </p:extLst>
+  </p:cSld>
+  <p:clrMapOvr>
+    <a:masterClrMapping/>
+  </p:clrMapOvr>
+</p:sld>
+</file>
+
+<file path=ppt/slides/slide5.xml><?xml version="1.0" encoding="utf-8"?>
+<p:sld xmlns:a="http://schemas.openxmlformats.org/drawingml/2006/main" xmlns:r="http://schemas.openxmlformats.org/officeDocument/2006/relationships" xmlns:p="http://schemas.openxmlformats.org/presentationml/2006/main">
+  <p:cSld>
+    <p:spTree>
+      <p:nvGrpSpPr>
+        <p:cNvPr id="1" name=""/>
+        <p:cNvGrpSpPr/>
+        <p:nvPr/>
+      </p:nvGrpSpPr>
+      <p:grpSpPr>
+        <a:xfrm>
+          <a:off x="0" y="0"/>
+          <a:ext cx="0" cy="0"/>
+          <a:chOff x="0" y="0"/>
+          <a:chExt cx="0" cy="0"/>
+        </a:xfrm>
+      </p:grpSpPr>
+      <p:pic>
+        <p:nvPicPr>
+          <p:cNvPr id="3" name="그림 2">
+            <a:extLst>
+              <a:ext uri="{FF2B5EF4-FFF2-40B4-BE49-F238E27FC236}">
+                <a16:creationId xmlns:a16="http://schemas.microsoft.com/office/drawing/2014/main" id="{7A733A21-6F9B-4096-B4DA-88DD96D95667}"/>
+              </a:ext>
+            </a:extLst>
+          </p:cNvPr>
+          <p:cNvPicPr>
+            <a:picLocks noChangeAspect="1"/>
+          </p:cNvPicPr>
+          <p:nvPr/>
+        </p:nvPicPr>
+        <p:blipFill>
+          <a:blip r:embed="rId2"/>
+          <a:stretch>
+            <a:fillRect/>
+          </a:stretch>
+        </p:blipFill>
+        <p:spPr>
+          <a:xfrm>
+            <a:off x="0" y="457200"/>
+            <a:ext cx="12192000" cy="5943600"/>
+          </a:xfrm>
+          <a:prstGeom prst="rect">
+            <a:avLst/>
+          </a:prstGeom>
+        </p:spPr>
+      </p:pic>
+      <p:sp>
+        <p:nvSpPr>
+          <p:cNvPr id="2" name="TextBox 1">
+            <a:extLst>
+              <a:ext uri="{FF2B5EF4-FFF2-40B4-BE49-F238E27FC236}">
+                <a16:creationId xmlns:a16="http://schemas.microsoft.com/office/drawing/2014/main" id="{7FA18ECA-B8F9-47B2-B57C-2CAC013368C1}"/>
+              </a:ext>
+            </a:extLst>
+          </p:cNvPr>
+          <p:cNvSpPr txBox="1"/>
+          <p:nvPr/>
+        </p:nvSpPr>
+        <p:spPr>
+          <a:xfrm>
+            <a:off x="387275" y="272534"/>
+            <a:ext cx="3248809" cy="369332"/>
+          </a:xfrm>
+          <a:prstGeom prst="rect">
+            <a:avLst/>
+          </a:prstGeom>
+          <a:noFill/>
+        </p:spPr>
+        <p:txBody>
+          <a:bodyPr wrap="square" rtlCol="0">
+            <a:spAutoFit/>
+          </a:bodyPr>
+          <a:lstStyle/>
+          <a:p>
+            <a:r>
+              <a:rPr lang="en-US" altLang="ko-KR" dirty="0"/>
+              <a:t>Amp:1, </a:t>
+            </a:r>
+            <a:r>
+              <a:rPr lang="en-US" altLang="ko-KR" dirty="0" err="1"/>
+              <a:t>pnts</a:t>
+            </a:r>
+            <a:r>
+              <a:rPr lang="en-US" altLang="ko-KR" dirty="0"/>
+              <a:t>: 100, N:10</a:t>
+            </a:r>
+            <a:endParaRPr lang="ko-KR" altLang="en-US" dirty="0"/>
+          </a:p>
+        </p:txBody>
+      </p:sp>
+    </p:spTree>
+    <p:extLst>
+      <p:ext uri="{BB962C8B-B14F-4D97-AF65-F5344CB8AC3E}">
+        <p14:creationId xmlns:p14="http://schemas.microsoft.com/office/powerpoint/2010/main" val="3279852663"/>
+      </p:ext>
+    </p:extLst>
+  </p:cSld>
+  <p:clrMapOvr>
+    <a:masterClrMapping/>
+  </p:clrMapOvr>
+</p:sld>
+</file>
+
+<file path=ppt/slides/slide6.xml><?xml version="1.0" encoding="utf-8"?>
+<p:sld xmlns:a="http://schemas.openxmlformats.org/drawingml/2006/main" xmlns:r="http://schemas.openxmlformats.org/officeDocument/2006/relationships" xmlns:p="http://schemas.openxmlformats.org/presentationml/2006/main">
+  <p:cSld>
+    <p:spTree>
+      <p:nvGrpSpPr>
+        <p:cNvPr id="1" name=""/>
+        <p:cNvGrpSpPr/>
+        <p:nvPr/>
+      </p:nvGrpSpPr>
+      <p:grpSpPr>
+        <a:xfrm>
+          <a:off x="0" y="0"/>
+          <a:ext cx="0" cy="0"/>
+          <a:chOff x="0" y="0"/>
+          <a:chExt cx="0" cy="0"/>
+        </a:xfrm>
+      </p:grpSpPr>
+      <p:pic>
+        <p:nvPicPr>
+          <p:cNvPr id="3" name="그림 2">
+            <a:extLst>
+              <a:ext uri="{FF2B5EF4-FFF2-40B4-BE49-F238E27FC236}">
+                <a16:creationId xmlns:a16="http://schemas.microsoft.com/office/drawing/2014/main" id="{62003483-E80B-4EA7-B05B-D21F2B3985D7}"/>
+              </a:ext>
+            </a:extLst>
+          </p:cNvPr>
+          <p:cNvPicPr>
+            <a:picLocks noChangeAspect="1"/>
+          </p:cNvPicPr>
+          <p:nvPr/>
+        </p:nvPicPr>
+        <p:blipFill>
+          <a:blip r:embed="rId2"/>
+          <a:stretch>
+            <a:fillRect/>
+          </a:stretch>
+        </p:blipFill>
+        <p:spPr>
+          <a:xfrm>
+            <a:off x="0" y="457200"/>
+            <a:ext cx="12192000" cy="5943600"/>
+          </a:xfrm>
+          <a:prstGeom prst="rect">
+            <a:avLst/>
+          </a:prstGeom>
+        </p:spPr>
+      </p:pic>
+      <p:sp>
+        <p:nvSpPr>
+          <p:cNvPr id="4" name="TextBox 3">
+            <a:extLst>
+              <a:ext uri="{FF2B5EF4-FFF2-40B4-BE49-F238E27FC236}">
+                <a16:creationId xmlns:a16="http://schemas.microsoft.com/office/drawing/2014/main" id="{BC59C00E-D95B-4FE9-9E06-849CE87F35B9}"/>
+              </a:ext>
+            </a:extLst>
+          </p:cNvPr>
+          <p:cNvSpPr txBox="1"/>
+          <p:nvPr/>
+        </p:nvSpPr>
+        <p:spPr>
+          <a:xfrm>
+            <a:off x="387276" y="272534"/>
+            <a:ext cx="914400" cy="369332"/>
+          </a:xfrm>
+          <a:prstGeom prst="rect">
+            <a:avLst/>
+          </a:prstGeom>
+          <a:noFill/>
+        </p:spPr>
+        <p:txBody>
+          <a:bodyPr wrap="square" rtlCol="0">
+            <a:spAutoFit/>
+          </a:bodyPr>
+          <a:lstStyle/>
+          <a:p>
+            <a:r>
+              <a:rPr lang="en-US" altLang="ko-KR" dirty="0"/>
+              <a:t>Amp:2</a:t>
+            </a:r>
+            <a:endParaRPr lang="ko-KR" altLang="en-US" dirty="0"/>
+          </a:p>
+        </p:txBody>
+      </p:sp>
+    </p:spTree>
+    <p:extLst>
+      <p:ext uri="{BB962C8B-B14F-4D97-AF65-F5344CB8AC3E}">
+        <p14:creationId xmlns:p14="http://schemas.microsoft.com/office/powerpoint/2010/main" val="2454697990"/>
+      </p:ext>
+    </p:extLst>
+  </p:cSld>
+  <p:clrMapOvr>
+    <a:masterClrMapping/>
+  </p:clrMapOvr>
+</p:sld>
+</file>
+
+<file path=ppt/slides/slide7.xml><?xml version="1.0" encoding="utf-8"?>
+<p:sld xmlns:a="http://schemas.openxmlformats.org/drawingml/2006/main" xmlns:r="http://schemas.openxmlformats.org/officeDocument/2006/relationships" xmlns:p="http://schemas.openxmlformats.org/presentationml/2006/main">
+  <p:cSld>
+    <p:spTree>
+      <p:nvGrpSpPr>
+        <p:cNvPr id="1" name=""/>
+        <p:cNvGrpSpPr/>
+        <p:nvPr/>
+      </p:nvGrpSpPr>
+      <p:grpSpPr>
+        <a:xfrm>
+          <a:off x="0" y="0"/>
+          <a:ext cx="0" cy="0"/>
+          <a:chOff x="0" y="0"/>
+          <a:chExt cx="0" cy="0"/>
+        </a:xfrm>
+      </p:grpSpPr>
+      <p:pic>
+        <p:nvPicPr>
+          <p:cNvPr id="3" name="그림 2">
+            <a:extLst>
+              <a:ext uri="{FF2B5EF4-FFF2-40B4-BE49-F238E27FC236}">
+                <a16:creationId xmlns:a16="http://schemas.microsoft.com/office/drawing/2014/main" id="{D81D502E-E16F-43E9-8C9F-BB3FEEE6E9AE}"/>
+              </a:ext>
+            </a:extLst>
+          </p:cNvPr>
+          <p:cNvPicPr>
+            <a:picLocks noChangeAspect="1"/>
+          </p:cNvPicPr>
+          <p:nvPr/>
+        </p:nvPicPr>
+        <p:blipFill>
+          <a:blip r:embed="rId2"/>
+          <a:stretch>
+            <a:fillRect/>
+          </a:stretch>
+        </p:blipFill>
+        <p:spPr>
+          <a:xfrm>
+            <a:off x="0" y="457200"/>
+            <a:ext cx="12192000" cy="5943600"/>
+          </a:xfrm>
+          <a:prstGeom prst="rect">
+            <a:avLst/>
+          </a:prstGeom>
+        </p:spPr>
+      </p:pic>
+      <p:sp>
+        <p:nvSpPr>
+          <p:cNvPr id="4" name="TextBox 3">
+            <a:extLst>
+              <a:ext uri="{FF2B5EF4-FFF2-40B4-BE49-F238E27FC236}">
+                <a16:creationId xmlns:a16="http://schemas.microsoft.com/office/drawing/2014/main" id="{632B2EF2-0BA0-4EFE-A38D-4A8171EC7C32}"/>
+              </a:ext>
+            </a:extLst>
+          </p:cNvPr>
+          <p:cNvSpPr txBox="1"/>
+          <p:nvPr/>
+        </p:nvSpPr>
+        <p:spPr>
+          <a:xfrm>
+            <a:off x="387275" y="272534"/>
+            <a:ext cx="3248809" cy="369332"/>
+          </a:xfrm>
+          <a:prstGeom prst="rect">
+            <a:avLst/>
+          </a:prstGeom>
+          <a:noFill/>
+        </p:spPr>
+        <p:txBody>
+          <a:bodyPr wrap="square" rtlCol="0">
+            <a:spAutoFit/>
+          </a:bodyPr>
+          <a:lstStyle/>
+          <a:p>
+            <a:r>
+              <a:rPr lang="en-US" altLang="ko-KR" dirty="0"/>
+              <a:t>Amp:1, </a:t>
+            </a:r>
+            <a:r>
+              <a:rPr lang="en-US" altLang="ko-KR" dirty="0" err="1"/>
+              <a:t>pnts</a:t>
+            </a:r>
+            <a:r>
+              <a:rPr lang="en-US" altLang="ko-KR"/>
+              <a:t>: 1000</a:t>
+            </a:r>
+            <a:r>
+              <a:rPr lang="en-US" altLang="ko-KR" dirty="0"/>
+              <a:t>, N</a:t>
+            </a:r>
+            <a:r>
+              <a:rPr lang="en-US" altLang="ko-KR"/>
+              <a:t>:100</a:t>
+            </a:r>
+            <a:endParaRPr lang="ko-KR" altLang="en-US" dirty="0"/>
+          </a:p>
+        </p:txBody>
+      </p:sp>
+    </p:spTree>
+    <p:extLst>
+      <p:ext uri="{BB962C8B-B14F-4D97-AF65-F5344CB8AC3E}">
+        <p14:creationId xmlns:p14="http://schemas.microsoft.com/office/powerpoint/2010/main" val="3998537864"/>
       </p:ext>
     </p:extLst>
   </p:cSld>

</xml_diff>